<commit_message>
Premium Listener & Dynamic Time
</commit_message>
<xml_diff>
--- a/Assets/Wireframes (1).pptx
+++ b/Assets/Wireframes (1).pptx
@@ -1,6 +1,6 @@
 
 <file path=ppt/presentation.xml><?xml version="1.0" encoding="utf-8"?>
-<p:presentation xmlns:a="http://schemas.openxmlformats.org/drawingml/2006/main" xmlns:r="http://schemas.openxmlformats.org/officeDocument/2006/relationships" xmlns:p="http://schemas.openxmlformats.org/presentationml/2006/main" saveSubsetFonts="1">
+<p:presentation xmlns:a="http://schemas.openxmlformats.org/drawingml/2006/main" xmlns:r="http://schemas.openxmlformats.org/officeDocument/2006/relationships" xmlns:mc="http://schemas.openxmlformats.org/markup-compatibility/2006" xmlns:mv="urn:schemas-microsoft-com:mac:vml" xmlns:p="http://schemas.openxmlformats.org/presentationml/2006/main" mc:Ignorable="mv" mc:PreserveAttributes="mv:*" saveSubsetFonts="1">
   <p:sldMasterIdLst>
     <p:sldMasterId id="2147483660" r:id="rId1"/>
   </p:sldMasterIdLst>
@@ -110,7 +110,7 @@
   </p:defaultTextStyle>
   <p:extLst>
     <p:ext uri="{EFAFB233-063F-42B5-8137-9DF3F51BA10A}">
-      <p15:sldGuideLst xmlns:p15="http://schemas.microsoft.com/office/powerpoint/2012/main"/>
+      <p15:sldGuideLst xmlns:p15="http://schemas.microsoft.com/office/powerpoint/2012/main" xmlns:p="http://schemas.openxmlformats.org/presentationml/2006/main" xmlns:r="http://schemas.openxmlformats.org/officeDocument/2006/relationships" xmlns:a="http://schemas.openxmlformats.org/drawingml/2006/main" xmlns=""/>
     </p:ext>
   </p:extLst>
 </p:presentation>
@@ -535,7 +535,7 @@
 </file>
 
 <file path=ppt/notesMasters/notesMaster1.xml><?xml version="1.0" encoding="utf-8"?>
-<p:notesMaster xmlns:a="http://schemas.openxmlformats.org/drawingml/2006/main" xmlns:r="http://schemas.openxmlformats.org/officeDocument/2006/relationships" xmlns:p="http://schemas.openxmlformats.org/presentationml/2006/main">
+<p:notesMaster xmlns:a="http://schemas.openxmlformats.org/drawingml/2006/main" xmlns:r="http://schemas.openxmlformats.org/officeDocument/2006/relationships" xmlns:mc="http://schemas.openxmlformats.org/markup-compatibility/2006" xmlns:mv="urn:schemas-microsoft-com:mac:vml" xmlns:p="http://schemas.openxmlformats.org/presentationml/2006/main" mc:Ignorable="mv" mc:PreserveAttributes="mv:*">
   <p:cSld>
     <p:bg>
       <p:bgRef idx="1001">
@@ -616,7 +616,8 @@
           <a:p>
             <a:fld id="{2DCA1C18-069A-4ED6-B58A-8C97210CB9CB}" type="datetimeFigureOut">
               <a:rPr lang="en-US"/>
-              <a:t>3/1/2021</a:t>
+              <a:pPr/>
+              <a:t>3/6/21</a:t>
             </a:fld>
             <a:endParaRPr lang="en-US"/>
           </a:p>
@@ -774,6 +775,7 @@
           <a:p>
             <a:fld id="{C5CB1336-7260-4229-98D8-C7F121CC493A}" type="slidenum">
               <a:rPr lang="en-US"/>
+              <a:pPr/>
               <a:t>‹#›</a:t>
             </a:fld>
             <a:endParaRPr lang="en-US"/>
@@ -783,7 +785,7 @@
     </p:spTree>
     <p:extLst>
       <p:ext uri="{BB962C8B-B14F-4D97-AF65-F5344CB8AC3E}">
-        <p14:creationId xmlns:p14="http://schemas.microsoft.com/office/powerpoint/2010/main" val="3009305891"/>
+        <p14:creationId xmlns:p14="http://schemas.microsoft.com/office/powerpoint/2010/main" xmlns:p="http://schemas.openxmlformats.org/presentationml/2006/main" xmlns:r="http://schemas.openxmlformats.org/officeDocument/2006/relationships" xmlns:a="http://schemas.openxmlformats.org/drawingml/2006/main" xmlns="" val="3009305891"/>
       </p:ext>
     </p:extLst>
   </p:cSld>
@@ -884,7 +886,7 @@
 </file>
 
 <file path=ppt/notesSlides/notesSlide1.xml><?xml version="1.0" encoding="utf-8"?>
-<p:notes xmlns:a="http://schemas.openxmlformats.org/drawingml/2006/main" xmlns:r="http://schemas.openxmlformats.org/officeDocument/2006/relationships" xmlns:p="http://schemas.openxmlformats.org/presentationml/2006/main">
+<p:notes xmlns:a="http://schemas.openxmlformats.org/drawingml/2006/main" xmlns:r="http://schemas.openxmlformats.org/officeDocument/2006/relationships" xmlns:mc="http://schemas.openxmlformats.org/markup-compatibility/2006" xmlns:mv="urn:schemas-microsoft-com:mac:vml" xmlns:p="http://schemas.openxmlformats.org/presentationml/2006/main" mc:Ignorable="mv" mc:PreserveAttributes="mv:*">
   <p:cSld>
     <p:spTree>
       <p:nvGrpSpPr>
@@ -943,8 +945,53 @@
               <a:rPr lang="en-US" dirty="0">
                 <a:cs typeface="Calibri"/>
               </a:rPr>
-              <a:t> define type of user)</a:t>
-            </a:r>
+              <a:t> define type of user</a:t>
+            </a:r>
+            <a:r>
+              <a:rPr lang="en-US" dirty="0" smtClean="0">
+                <a:cs typeface="Calibri"/>
+              </a:rPr>
+              <a:t>)</a:t>
+            </a:r>
+          </a:p>
+          <a:p>
+            <a:r>
+              <a:rPr lang="en-US" dirty="0" smtClean="0">
+                <a:cs typeface="Calibri"/>
+              </a:rPr>
+              <a:t>-Dynamic</a:t>
+            </a:r>
+            <a:r>
+              <a:rPr lang="en-US" baseline="0" dirty="0" smtClean="0">
+                <a:cs typeface="Calibri"/>
+              </a:rPr>
+              <a:t> course collection for numbers of holes and images stored in firebase that we can adjust as new courses are </a:t>
+            </a:r>
+            <a:r>
+              <a:rPr lang="en-US" baseline="0" dirty="0" err="1" smtClean="0">
+                <a:cs typeface="Calibri"/>
+              </a:rPr>
+              <a:t>onboarded</a:t>
+            </a:r>
+            <a:r>
+              <a:rPr lang="en-US" baseline="0" dirty="0" smtClean="0">
+                <a:cs typeface="Calibri"/>
+              </a:rPr>
+              <a:t> </a:t>
+            </a:r>
+          </a:p>
+          <a:p>
+            <a:r>
+              <a:rPr lang="en-US" baseline="0" dirty="0" smtClean="0">
+                <a:cs typeface="Calibri"/>
+              </a:rPr>
+              <a:t>-Punt on login page formatting</a:t>
+            </a:r>
+          </a:p>
+          <a:p>
+            <a:endParaRPr lang="en-US" dirty="0">
+              <a:cs typeface="Calibri"/>
+            </a:endParaRPr>
           </a:p>
         </p:txBody>
       </p:sp>
@@ -965,7 +1012,8 @@
           <a:p>
             <a:fld id="{C5CB1336-7260-4229-98D8-C7F121CC493A}" type="slidenum">
               <a:rPr lang="en-US"/>
-              <a:t>‹#›</a:t>
+              <a:pPr/>
+              <a:t>1</a:t>
             </a:fld>
             <a:endParaRPr lang="en-US"/>
           </a:p>
@@ -974,7 +1022,7 @@
     </p:spTree>
     <p:extLst>
       <p:ext uri="{BB962C8B-B14F-4D97-AF65-F5344CB8AC3E}">
-        <p14:creationId xmlns:p14="http://schemas.microsoft.com/office/powerpoint/2010/main" val="1890118225"/>
+        <p14:creationId xmlns:p14="http://schemas.microsoft.com/office/powerpoint/2010/main" xmlns:p="http://schemas.openxmlformats.org/presentationml/2006/main" xmlns:r="http://schemas.openxmlformats.org/officeDocument/2006/relationships" xmlns:a="http://schemas.openxmlformats.org/drawingml/2006/main" xmlns="" val="1890118225"/>
       </p:ext>
     </p:extLst>
   </p:cSld>
@@ -985,7 +1033,7 @@
 </file>
 
 <file path=ppt/slideLayouts/slideLayout1.xml><?xml version="1.0" encoding="utf-8"?>
-<p:sldLayout xmlns:a="http://schemas.openxmlformats.org/drawingml/2006/main" xmlns:r="http://schemas.openxmlformats.org/officeDocument/2006/relationships" xmlns:p="http://schemas.openxmlformats.org/presentationml/2006/main" type="title" preserve="1">
+<p:sldLayout xmlns:a="http://schemas.openxmlformats.org/drawingml/2006/main" xmlns:r="http://schemas.openxmlformats.org/officeDocument/2006/relationships" xmlns:mc="http://schemas.openxmlformats.org/markup-compatibility/2006" xmlns:mv="urn:schemas-microsoft-com:mac:vml" xmlns:p="http://schemas.openxmlformats.org/presentationml/2006/main" mc:Ignorable="mv" mc:PreserveAttributes="mv:*" type="title" preserve="1">
   <p:cSld name="Title Slide">
     <p:spTree>
       <p:nvGrpSpPr>
@@ -1115,7 +1163,8 @@
           <a:p>
             <a:fld id="{846CE7D5-CF57-46EF-B807-FDD0502418D4}" type="datetimeFigureOut">
               <a:rPr lang="en-US" smtClean="0"/>
-              <a:t>3/1/2021</a:t>
+              <a:pPr/>
+              <a:t>3/6/21</a:t>
             </a:fld>
             <a:endParaRPr lang="en-US"/>
           </a:p>
@@ -1157,6 +1206,7 @@
           <a:p>
             <a:fld id="{330EA680-D336-4FF7-8B7A-9848BB0A1C32}" type="slidenum">
               <a:rPr lang="en-US" smtClean="0"/>
+              <a:pPr/>
               <a:t>‹#›</a:t>
             </a:fld>
             <a:endParaRPr lang="en-US"/>
@@ -1166,7 +1216,7 @@
     </p:spTree>
     <p:extLst>
       <p:ext uri="{BB962C8B-B14F-4D97-AF65-F5344CB8AC3E}">
-        <p14:creationId xmlns:p14="http://schemas.microsoft.com/office/powerpoint/2010/main" val="2385387890"/>
+        <p14:creationId xmlns:p14="http://schemas.microsoft.com/office/powerpoint/2010/main" xmlns:p="http://schemas.openxmlformats.org/presentationml/2006/main" xmlns:r="http://schemas.openxmlformats.org/officeDocument/2006/relationships" xmlns:a="http://schemas.openxmlformats.org/drawingml/2006/main" xmlns="" val="2385387890"/>
       </p:ext>
     </p:extLst>
   </p:cSld>
@@ -1177,7 +1227,7 @@
 </file>
 
 <file path=ppt/slideLayouts/slideLayout10.xml><?xml version="1.0" encoding="utf-8"?>
-<p:sldLayout xmlns:a="http://schemas.openxmlformats.org/drawingml/2006/main" xmlns:r="http://schemas.openxmlformats.org/officeDocument/2006/relationships" xmlns:p="http://schemas.openxmlformats.org/presentationml/2006/main" type="vertTx" preserve="1">
+<p:sldLayout xmlns:a="http://schemas.openxmlformats.org/drawingml/2006/main" xmlns:r="http://schemas.openxmlformats.org/officeDocument/2006/relationships" xmlns:mc="http://schemas.openxmlformats.org/markup-compatibility/2006" xmlns:mv="urn:schemas-microsoft-com:mac:vml" xmlns:p="http://schemas.openxmlformats.org/presentationml/2006/main" mc:Ignorable="mv" mc:PreserveAttributes="mv:*" type="vertTx" preserve="1">
   <p:cSld name="Title and Vertical Text">
     <p:spTree>
       <p:nvGrpSpPr>
@@ -1285,7 +1335,8 @@
           <a:p>
             <a:fld id="{846CE7D5-CF57-46EF-B807-FDD0502418D4}" type="datetimeFigureOut">
               <a:rPr lang="en-US" smtClean="0"/>
-              <a:t>3/1/2021</a:t>
+              <a:pPr/>
+              <a:t>3/6/21</a:t>
             </a:fld>
             <a:endParaRPr lang="en-US"/>
           </a:p>
@@ -1327,6 +1378,7 @@
           <a:p>
             <a:fld id="{330EA680-D336-4FF7-8B7A-9848BB0A1C32}" type="slidenum">
               <a:rPr lang="en-US" smtClean="0"/>
+              <a:pPr/>
               <a:t>‹#›</a:t>
             </a:fld>
             <a:endParaRPr lang="en-US"/>
@@ -1336,7 +1388,7 @@
     </p:spTree>
     <p:extLst>
       <p:ext uri="{BB962C8B-B14F-4D97-AF65-F5344CB8AC3E}">
-        <p14:creationId xmlns:p14="http://schemas.microsoft.com/office/powerpoint/2010/main" val="2202905451"/>
+        <p14:creationId xmlns:p14="http://schemas.microsoft.com/office/powerpoint/2010/main" xmlns:p="http://schemas.openxmlformats.org/presentationml/2006/main" xmlns:r="http://schemas.openxmlformats.org/officeDocument/2006/relationships" xmlns:a="http://schemas.openxmlformats.org/drawingml/2006/main" xmlns="" val="2202905451"/>
       </p:ext>
     </p:extLst>
   </p:cSld>
@@ -1347,7 +1399,7 @@
 </file>
 
 <file path=ppt/slideLayouts/slideLayout11.xml><?xml version="1.0" encoding="utf-8"?>
-<p:sldLayout xmlns:a="http://schemas.openxmlformats.org/drawingml/2006/main" xmlns:r="http://schemas.openxmlformats.org/officeDocument/2006/relationships" xmlns:p="http://schemas.openxmlformats.org/presentationml/2006/main" type="vertTitleAndTx" preserve="1">
+<p:sldLayout xmlns:a="http://schemas.openxmlformats.org/drawingml/2006/main" xmlns:r="http://schemas.openxmlformats.org/officeDocument/2006/relationships" xmlns:mc="http://schemas.openxmlformats.org/markup-compatibility/2006" xmlns:mv="urn:schemas-microsoft-com:mac:vml" xmlns:p="http://schemas.openxmlformats.org/presentationml/2006/main" mc:Ignorable="mv" mc:PreserveAttributes="mv:*" type="vertTitleAndTx" preserve="1">
   <p:cSld name="Vertical Title and Text">
     <p:spTree>
       <p:nvGrpSpPr>
@@ -1465,7 +1517,8 @@
           <a:p>
             <a:fld id="{846CE7D5-CF57-46EF-B807-FDD0502418D4}" type="datetimeFigureOut">
               <a:rPr lang="en-US" smtClean="0"/>
-              <a:t>3/1/2021</a:t>
+              <a:pPr/>
+              <a:t>3/6/21</a:t>
             </a:fld>
             <a:endParaRPr lang="en-US"/>
           </a:p>
@@ -1507,6 +1560,7 @@
           <a:p>
             <a:fld id="{330EA680-D336-4FF7-8B7A-9848BB0A1C32}" type="slidenum">
               <a:rPr lang="en-US" smtClean="0"/>
+              <a:pPr/>
               <a:t>‹#›</a:t>
             </a:fld>
             <a:endParaRPr lang="en-US"/>
@@ -1516,7 +1570,7 @@
     </p:spTree>
     <p:extLst>
       <p:ext uri="{BB962C8B-B14F-4D97-AF65-F5344CB8AC3E}">
-        <p14:creationId xmlns:p14="http://schemas.microsoft.com/office/powerpoint/2010/main" val="3479445657"/>
+        <p14:creationId xmlns:p14="http://schemas.microsoft.com/office/powerpoint/2010/main" xmlns:p="http://schemas.openxmlformats.org/presentationml/2006/main" xmlns:r="http://schemas.openxmlformats.org/officeDocument/2006/relationships" xmlns:a="http://schemas.openxmlformats.org/drawingml/2006/main" xmlns="" val="3479445657"/>
       </p:ext>
     </p:extLst>
   </p:cSld>
@@ -1527,7 +1581,7 @@
 </file>
 
 <file path=ppt/slideLayouts/slideLayout2.xml><?xml version="1.0" encoding="utf-8"?>
-<p:sldLayout xmlns:a="http://schemas.openxmlformats.org/drawingml/2006/main" xmlns:r="http://schemas.openxmlformats.org/officeDocument/2006/relationships" xmlns:p="http://schemas.openxmlformats.org/presentationml/2006/main" type="obj" preserve="1">
+<p:sldLayout xmlns:a="http://schemas.openxmlformats.org/drawingml/2006/main" xmlns:r="http://schemas.openxmlformats.org/officeDocument/2006/relationships" xmlns:mc="http://schemas.openxmlformats.org/markup-compatibility/2006" xmlns:mv="urn:schemas-microsoft-com:mac:vml" xmlns:p="http://schemas.openxmlformats.org/presentationml/2006/main" mc:Ignorable="mv" mc:PreserveAttributes="mv:*" type="obj" preserve="1">
   <p:cSld name="Title and Content">
     <p:spTree>
       <p:nvGrpSpPr>
@@ -1635,7 +1689,8 @@
           <a:p>
             <a:fld id="{846CE7D5-CF57-46EF-B807-FDD0502418D4}" type="datetimeFigureOut">
               <a:rPr lang="en-US" smtClean="0"/>
-              <a:t>3/1/2021</a:t>
+              <a:pPr/>
+              <a:t>3/6/21</a:t>
             </a:fld>
             <a:endParaRPr lang="en-US"/>
           </a:p>
@@ -1677,6 +1732,7 @@
           <a:p>
             <a:fld id="{330EA680-D336-4FF7-8B7A-9848BB0A1C32}" type="slidenum">
               <a:rPr lang="en-US" smtClean="0"/>
+              <a:pPr/>
               <a:t>‹#›</a:t>
             </a:fld>
             <a:endParaRPr lang="en-US"/>
@@ -1686,7 +1742,7 @@
     </p:spTree>
     <p:extLst>
       <p:ext uri="{BB962C8B-B14F-4D97-AF65-F5344CB8AC3E}">
-        <p14:creationId xmlns:p14="http://schemas.microsoft.com/office/powerpoint/2010/main" val="949138452"/>
+        <p14:creationId xmlns:p14="http://schemas.microsoft.com/office/powerpoint/2010/main" xmlns:p="http://schemas.openxmlformats.org/presentationml/2006/main" xmlns:r="http://schemas.openxmlformats.org/officeDocument/2006/relationships" xmlns:a="http://schemas.openxmlformats.org/drawingml/2006/main" xmlns="" val="949138452"/>
       </p:ext>
     </p:extLst>
   </p:cSld>
@@ -1697,7 +1753,7 @@
 </file>
 
 <file path=ppt/slideLayouts/slideLayout3.xml><?xml version="1.0" encoding="utf-8"?>
-<p:sldLayout xmlns:a="http://schemas.openxmlformats.org/drawingml/2006/main" xmlns:r="http://schemas.openxmlformats.org/officeDocument/2006/relationships" xmlns:p="http://schemas.openxmlformats.org/presentationml/2006/main" type="secHead" preserve="1">
+<p:sldLayout xmlns:a="http://schemas.openxmlformats.org/drawingml/2006/main" xmlns:r="http://schemas.openxmlformats.org/officeDocument/2006/relationships" xmlns:mc="http://schemas.openxmlformats.org/markup-compatibility/2006" xmlns:mv="urn:schemas-microsoft-com:mac:vml" xmlns:p="http://schemas.openxmlformats.org/presentationml/2006/main" mc:Ignorable="mv" mc:PreserveAttributes="mv:*" type="secHead" preserve="1">
   <p:cSld name="Section Header">
     <p:spTree>
       <p:nvGrpSpPr>
@@ -1881,7 +1937,8 @@
           <a:p>
             <a:fld id="{846CE7D5-CF57-46EF-B807-FDD0502418D4}" type="datetimeFigureOut">
               <a:rPr lang="en-US" smtClean="0"/>
-              <a:t>3/1/2021</a:t>
+              <a:pPr/>
+              <a:t>3/6/21</a:t>
             </a:fld>
             <a:endParaRPr lang="en-US"/>
           </a:p>
@@ -1923,6 +1980,7 @@
           <a:p>
             <a:fld id="{330EA680-D336-4FF7-8B7A-9848BB0A1C32}" type="slidenum">
               <a:rPr lang="en-US" smtClean="0"/>
+              <a:pPr/>
               <a:t>‹#›</a:t>
             </a:fld>
             <a:endParaRPr lang="en-US"/>
@@ -1932,7 +1990,7 @@
     </p:spTree>
     <p:extLst>
       <p:ext uri="{BB962C8B-B14F-4D97-AF65-F5344CB8AC3E}">
-        <p14:creationId xmlns:p14="http://schemas.microsoft.com/office/powerpoint/2010/main" val="2591524520"/>
+        <p14:creationId xmlns:p14="http://schemas.microsoft.com/office/powerpoint/2010/main" xmlns:p="http://schemas.openxmlformats.org/presentationml/2006/main" xmlns:r="http://schemas.openxmlformats.org/officeDocument/2006/relationships" xmlns:a="http://schemas.openxmlformats.org/drawingml/2006/main" xmlns="" val="2591524520"/>
       </p:ext>
     </p:extLst>
   </p:cSld>
@@ -1943,7 +2001,7 @@
 </file>
 
 <file path=ppt/slideLayouts/slideLayout4.xml><?xml version="1.0" encoding="utf-8"?>
-<p:sldLayout xmlns:a="http://schemas.openxmlformats.org/drawingml/2006/main" xmlns:r="http://schemas.openxmlformats.org/officeDocument/2006/relationships" xmlns:p="http://schemas.openxmlformats.org/presentationml/2006/main" type="twoObj" preserve="1">
+<p:sldLayout xmlns:a="http://schemas.openxmlformats.org/drawingml/2006/main" xmlns:r="http://schemas.openxmlformats.org/officeDocument/2006/relationships" xmlns:mc="http://schemas.openxmlformats.org/markup-compatibility/2006" xmlns:mv="urn:schemas-microsoft-com:mac:vml" xmlns:p="http://schemas.openxmlformats.org/presentationml/2006/main" mc:Ignorable="mv" mc:PreserveAttributes="mv:*" type="twoObj" preserve="1">
   <p:cSld name="Two Content">
     <p:spTree>
       <p:nvGrpSpPr>
@@ -2113,7 +2171,8 @@
           <a:p>
             <a:fld id="{846CE7D5-CF57-46EF-B807-FDD0502418D4}" type="datetimeFigureOut">
               <a:rPr lang="en-US" smtClean="0"/>
-              <a:t>3/1/2021</a:t>
+              <a:pPr/>
+              <a:t>3/6/21</a:t>
             </a:fld>
             <a:endParaRPr lang="en-US"/>
           </a:p>
@@ -2155,6 +2214,7 @@
           <a:p>
             <a:fld id="{330EA680-D336-4FF7-8B7A-9848BB0A1C32}" type="slidenum">
               <a:rPr lang="en-US" smtClean="0"/>
+              <a:pPr/>
               <a:t>‹#›</a:t>
             </a:fld>
             <a:endParaRPr lang="en-US"/>
@@ -2164,7 +2224,7 @@
     </p:spTree>
     <p:extLst>
       <p:ext uri="{BB962C8B-B14F-4D97-AF65-F5344CB8AC3E}">
-        <p14:creationId xmlns:p14="http://schemas.microsoft.com/office/powerpoint/2010/main" val="1203092039"/>
+        <p14:creationId xmlns:p14="http://schemas.microsoft.com/office/powerpoint/2010/main" xmlns:p="http://schemas.openxmlformats.org/presentationml/2006/main" xmlns:r="http://schemas.openxmlformats.org/officeDocument/2006/relationships" xmlns:a="http://schemas.openxmlformats.org/drawingml/2006/main" xmlns="" val="1203092039"/>
       </p:ext>
     </p:extLst>
   </p:cSld>
@@ -2175,7 +2235,7 @@
 </file>
 
 <file path=ppt/slideLayouts/slideLayout5.xml><?xml version="1.0" encoding="utf-8"?>
-<p:sldLayout xmlns:a="http://schemas.openxmlformats.org/drawingml/2006/main" xmlns:r="http://schemas.openxmlformats.org/officeDocument/2006/relationships" xmlns:p="http://schemas.openxmlformats.org/presentationml/2006/main" type="twoTxTwoObj" preserve="1">
+<p:sldLayout xmlns:a="http://schemas.openxmlformats.org/drawingml/2006/main" xmlns:r="http://schemas.openxmlformats.org/officeDocument/2006/relationships" xmlns:mc="http://schemas.openxmlformats.org/markup-compatibility/2006" xmlns:mv="urn:schemas-microsoft-com:mac:vml" xmlns:p="http://schemas.openxmlformats.org/presentationml/2006/main" mc:Ignorable="mv" mc:PreserveAttributes="mv:*" type="twoTxTwoObj" preserve="1">
   <p:cSld name="Comparison">
     <p:spTree>
       <p:nvGrpSpPr>
@@ -2480,7 +2540,8 @@
           <a:p>
             <a:fld id="{846CE7D5-CF57-46EF-B807-FDD0502418D4}" type="datetimeFigureOut">
               <a:rPr lang="en-US" smtClean="0"/>
-              <a:t>3/1/2021</a:t>
+              <a:pPr/>
+              <a:t>3/6/21</a:t>
             </a:fld>
             <a:endParaRPr lang="en-US"/>
           </a:p>
@@ -2522,6 +2583,7 @@
           <a:p>
             <a:fld id="{330EA680-D336-4FF7-8B7A-9848BB0A1C32}" type="slidenum">
               <a:rPr lang="en-US" smtClean="0"/>
+              <a:pPr/>
               <a:t>‹#›</a:t>
             </a:fld>
             <a:endParaRPr lang="en-US"/>
@@ -2531,7 +2593,7 @@
     </p:spTree>
     <p:extLst>
       <p:ext uri="{BB962C8B-B14F-4D97-AF65-F5344CB8AC3E}">
-        <p14:creationId xmlns:p14="http://schemas.microsoft.com/office/powerpoint/2010/main" val="3733172339"/>
+        <p14:creationId xmlns:p14="http://schemas.microsoft.com/office/powerpoint/2010/main" xmlns:p="http://schemas.openxmlformats.org/presentationml/2006/main" xmlns:r="http://schemas.openxmlformats.org/officeDocument/2006/relationships" xmlns:a="http://schemas.openxmlformats.org/drawingml/2006/main" xmlns="" val="3733172339"/>
       </p:ext>
     </p:extLst>
   </p:cSld>
@@ -2542,7 +2604,7 @@
 </file>
 
 <file path=ppt/slideLayouts/slideLayout6.xml><?xml version="1.0" encoding="utf-8"?>
-<p:sldLayout xmlns:a="http://schemas.openxmlformats.org/drawingml/2006/main" xmlns:r="http://schemas.openxmlformats.org/officeDocument/2006/relationships" xmlns:p="http://schemas.openxmlformats.org/presentationml/2006/main" type="titleOnly" preserve="1">
+<p:sldLayout xmlns:a="http://schemas.openxmlformats.org/drawingml/2006/main" xmlns:r="http://schemas.openxmlformats.org/officeDocument/2006/relationships" xmlns:mc="http://schemas.openxmlformats.org/markup-compatibility/2006" xmlns:mv="urn:schemas-microsoft-com:mac:vml" xmlns:p="http://schemas.openxmlformats.org/presentationml/2006/main" mc:Ignorable="mv" mc:PreserveAttributes="mv:*" type="titleOnly" preserve="1">
   <p:cSld name="Title Only">
     <p:spTree>
       <p:nvGrpSpPr>
@@ -2598,7 +2660,8 @@
           <a:p>
             <a:fld id="{846CE7D5-CF57-46EF-B807-FDD0502418D4}" type="datetimeFigureOut">
               <a:rPr lang="en-US" smtClean="0"/>
-              <a:t>3/1/2021</a:t>
+              <a:pPr/>
+              <a:t>3/6/21</a:t>
             </a:fld>
             <a:endParaRPr lang="en-US"/>
           </a:p>
@@ -2640,6 +2703,7 @@
           <a:p>
             <a:fld id="{330EA680-D336-4FF7-8B7A-9848BB0A1C32}" type="slidenum">
               <a:rPr lang="en-US" smtClean="0"/>
+              <a:pPr/>
               <a:t>‹#›</a:t>
             </a:fld>
             <a:endParaRPr lang="en-US"/>
@@ -2649,7 +2713,7 @@
     </p:spTree>
     <p:extLst>
       <p:ext uri="{BB962C8B-B14F-4D97-AF65-F5344CB8AC3E}">
-        <p14:creationId xmlns:p14="http://schemas.microsoft.com/office/powerpoint/2010/main" val="3210312558"/>
+        <p14:creationId xmlns:p14="http://schemas.microsoft.com/office/powerpoint/2010/main" xmlns:p="http://schemas.openxmlformats.org/presentationml/2006/main" xmlns:r="http://schemas.openxmlformats.org/officeDocument/2006/relationships" xmlns:a="http://schemas.openxmlformats.org/drawingml/2006/main" xmlns="" val="3210312558"/>
       </p:ext>
     </p:extLst>
   </p:cSld>
@@ -2660,7 +2724,7 @@
 </file>
 
 <file path=ppt/slideLayouts/slideLayout7.xml><?xml version="1.0" encoding="utf-8"?>
-<p:sldLayout xmlns:a="http://schemas.openxmlformats.org/drawingml/2006/main" xmlns:r="http://schemas.openxmlformats.org/officeDocument/2006/relationships" xmlns:p="http://schemas.openxmlformats.org/presentationml/2006/main" type="blank" preserve="1">
+<p:sldLayout xmlns:a="http://schemas.openxmlformats.org/drawingml/2006/main" xmlns:r="http://schemas.openxmlformats.org/officeDocument/2006/relationships" xmlns:mc="http://schemas.openxmlformats.org/markup-compatibility/2006" xmlns:mv="urn:schemas-microsoft-com:mac:vml" xmlns:p="http://schemas.openxmlformats.org/presentationml/2006/main" mc:Ignorable="mv" mc:PreserveAttributes="mv:*" type="blank" preserve="1">
   <p:cSld name="Blank">
     <p:spTree>
       <p:nvGrpSpPr>
@@ -2693,7 +2757,8 @@
           <a:p>
             <a:fld id="{846CE7D5-CF57-46EF-B807-FDD0502418D4}" type="datetimeFigureOut">
               <a:rPr lang="en-US" smtClean="0"/>
-              <a:t>3/1/2021</a:t>
+              <a:pPr/>
+              <a:t>3/6/21</a:t>
             </a:fld>
             <a:endParaRPr lang="en-US"/>
           </a:p>
@@ -2735,6 +2800,7 @@
           <a:p>
             <a:fld id="{330EA680-D336-4FF7-8B7A-9848BB0A1C32}" type="slidenum">
               <a:rPr lang="en-US" smtClean="0"/>
+              <a:pPr/>
               <a:t>‹#›</a:t>
             </a:fld>
             <a:endParaRPr lang="en-US"/>
@@ -2744,7 +2810,7 @@
     </p:spTree>
     <p:extLst>
       <p:ext uri="{BB962C8B-B14F-4D97-AF65-F5344CB8AC3E}">
-        <p14:creationId xmlns:p14="http://schemas.microsoft.com/office/powerpoint/2010/main" val="3146388984"/>
+        <p14:creationId xmlns:p14="http://schemas.microsoft.com/office/powerpoint/2010/main" xmlns:p="http://schemas.openxmlformats.org/presentationml/2006/main" xmlns:r="http://schemas.openxmlformats.org/officeDocument/2006/relationships" xmlns:a="http://schemas.openxmlformats.org/drawingml/2006/main" xmlns="" val="3146388984"/>
       </p:ext>
     </p:extLst>
   </p:cSld>
@@ -2755,7 +2821,7 @@
 </file>
 
 <file path=ppt/slideLayouts/slideLayout8.xml><?xml version="1.0" encoding="utf-8"?>
-<p:sldLayout xmlns:a="http://schemas.openxmlformats.org/drawingml/2006/main" xmlns:r="http://schemas.openxmlformats.org/officeDocument/2006/relationships" xmlns:p="http://schemas.openxmlformats.org/presentationml/2006/main" type="objTx" preserve="1">
+<p:sldLayout xmlns:a="http://schemas.openxmlformats.org/drawingml/2006/main" xmlns:r="http://schemas.openxmlformats.org/officeDocument/2006/relationships" xmlns:mc="http://schemas.openxmlformats.org/markup-compatibility/2006" xmlns:mv="urn:schemas-microsoft-com:mac:vml" xmlns:p="http://schemas.openxmlformats.org/presentationml/2006/main" mc:Ignorable="mv" mc:PreserveAttributes="mv:*" type="objTx" preserve="1">
   <p:cSld name="Content with Caption">
     <p:spTree>
       <p:nvGrpSpPr>
@@ -2970,7 +3036,8 @@
           <a:p>
             <a:fld id="{846CE7D5-CF57-46EF-B807-FDD0502418D4}" type="datetimeFigureOut">
               <a:rPr lang="en-US" smtClean="0"/>
-              <a:t>3/1/2021</a:t>
+              <a:pPr/>
+              <a:t>3/6/21</a:t>
             </a:fld>
             <a:endParaRPr lang="en-US"/>
           </a:p>
@@ -3012,6 +3079,7 @@
           <a:p>
             <a:fld id="{330EA680-D336-4FF7-8B7A-9848BB0A1C32}" type="slidenum">
               <a:rPr lang="en-US" smtClean="0"/>
+              <a:pPr/>
               <a:t>‹#›</a:t>
             </a:fld>
             <a:endParaRPr lang="en-US"/>
@@ -3021,7 +3089,7 @@
     </p:spTree>
     <p:extLst>
       <p:ext uri="{BB962C8B-B14F-4D97-AF65-F5344CB8AC3E}">
-        <p14:creationId xmlns:p14="http://schemas.microsoft.com/office/powerpoint/2010/main" val="3171841454"/>
+        <p14:creationId xmlns:p14="http://schemas.microsoft.com/office/powerpoint/2010/main" xmlns:p="http://schemas.openxmlformats.org/presentationml/2006/main" xmlns:r="http://schemas.openxmlformats.org/officeDocument/2006/relationships" xmlns:a="http://schemas.openxmlformats.org/drawingml/2006/main" xmlns="" val="3171841454"/>
       </p:ext>
     </p:extLst>
   </p:cSld>
@@ -3032,7 +3100,7 @@
 </file>
 
 <file path=ppt/slideLayouts/slideLayout9.xml><?xml version="1.0" encoding="utf-8"?>
-<p:sldLayout xmlns:a="http://schemas.openxmlformats.org/drawingml/2006/main" xmlns:r="http://schemas.openxmlformats.org/officeDocument/2006/relationships" xmlns:p="http://schemas.openxmlformats.org/presentationml/2006/main" type="picTx" preserve="1">
+<p:sldLayout xmlns:a="http://schemas.openxmlformats.org/drawingml/2006/main" xmlns:r="http://schemas.openxmlformats.org/officeDocument/2006/relationships" xmlns:mc="http://schemas.openxmlformats.org/markup-compatibility/2006" xmlns:mv="urn:schemas-microsoft-com:mac:vml" xmlns:p="http://schemas.openxmlformats.org/presentationml/2006/main" mc:Ignorable="mv" mc:PreserveAttributes="mv:*" type="picTx" preserve="1">
   <p:cSld name="Picture with Caption">
     <p:spTree>
       <p:nvGrpSpPr>
@@ -3227,7 +3295,8 @@
           <a:p>
             <a:fld id="{846CE7D5-CF57-46EF-B807-FDD0502418D4}" type="datetimeFigureOut">
               <a:rPr lang="en-US" smtClean="0"/>
-              <a:t>3/1/2021</a:t>
+              <a:pPr/>
+              <a:t>3/6/21</a:t>
             </a:fld>
             <a:endParaRPr lang="en-US"/>
           </a:p>
@@ -3269,6 +3338,7 @@
           <a:p>
             <a:fld id="{330EA680-D336-4FF7-8B7A-9848BB0A1C32}" type="slidenum">
               <a:rPr lang="en-US" smtClean="0"/>
+              <a:pPr/>
               <a:t>‹#›</a:t>
             </a:fld>
             <a:endParaRPr lang="en-US"/>
@@ -3278,7 +3348,7 @@
     </p:spTree>
     <p:extLst>
       <p:ext uri="{BB962C8B-B14F-4D97-AF65-F5344CB8AC3E}">
-        <p14:creationId xmlns:p14="http://schemas.microsoft.com/office/powerpoint/2010/main" val="1718958274"/>
+        <p14:creationId xmlns:p14="http://schemas.microsoft.com/office/powerpoint/2010/main" xmlns:p="http://schemas.openxmlformats.org/presentationml/2006/main" xmlns:r="http://schemas.openxmlformats.org/officeDocument/2006/relationships" xmlns:a="http://schemas.openxmlformats.org/drawingml/2006/main" xmlns="" val="1718958274"/>
       </p:ext>
     </p:extLst>
   </p:cSld>
@@ -3289,7 +3359,7 @@
 </file>
 
 <file path=ppt/slideMasters/slideMaster1.xml><?xml version="1.0" encoding="utf-8"?>
-<p:sldMaster xmlns:a="http://schemas.openxmlformats.org/drawingml/2006/main" xmlns:r="http://schemas.openxmlformats.org/officeDocument/2006/relationships" xmlns:p="http://schemas.openxmlformats.org/presentationml/2006/main">
+<p:sldMaster xmlns:a="http://schemas.openxmlformats.org/drawingml/2006/main" xmlns:r="http://schemas.openxmlformats.org/officeDocument/2006/relationships" xmlns:mc="http://schemas.openxmlformats.org/markup-compatibility/2006" xmlns:mv="urn:schemas-microsoft-com:mac:vml" xmlns:p="http://schemas.openxmlformats.org/presentationml/2006/main" mc:Ignorable="mv" mc:PreserveAttributes="mv:*">
   <p:cSld>
     <p:bg>
       <p:bgRef idx="1001">
@@ -3440,7 +3510,8 @@
           <a:p>
             <a:fld id="{846CE7D5-CF57-46EF-B807-FDD0502418D4}" type="datetimeFigureOut">
               <a:rPr lang="en-US" smtClean="0"/>
-              <a:t>3/1/2021</a:t>
+              <a:pPr/>
+              <a:t>3/6/21</a:t>
             </a:fld>
             <a:endParaRPr lang="en-US"/>
           </a:p>
@@ -3518,6 +3589,7 @@
           <a:p>
             <a:fld id="{330EA680-D336-4FF7-8B7A-9848BB0A1C32}" type="slidenum">
               <a:rPr lang="en-US" smtClean="0"/>
+              <a:pPr/>
               <a:t>‹#›</a:t>
             </a:fld>
             <a:endParaRPr lang="en-US"/>
@@ -3527,7 +3599,7 @@
     </p:spTree>
     <p:extLst>
       <p:ext uri="{BB962C8B-B14F-4D97-AF65-F5344CB8AC3E}">
-        <p14:creationId xmlns:p14="http://schemas.microsoft.com/office/powerpoint/2010/main" val="2460954070"/>
+        <p14:creationId xmlns:p14="http://schemas.microsoft.com/office/powerpoint/2010/main" xmlns:p="http://schemas.openxmlformats.org/presentationml/2006/main" xmlns:r="http://schemas.openxmlformats.org/officeDocument/2006/relationships" xmlns:a="http://schemas.openxmlformats.org/drawingml/2006/main" xmlns="" val="2460954070"/>
       </p:ext>
     </p:extLst>
   </p:cSld>
@@ -3829,7 +3901,7 @@
 </file>
 
 <file path=ppt/slides/slide1.xml><?xml version="1.0" encoding="utf-8"?>
-<p:sld xmlns:a="http://schemas.openxmlformats.org/drawingml/2006/main" xmlns:r="http://schemas.openxmlformats.org/officeDocument/2006/relationships" xmlns:p="http://schemas.openxmlformats.org/presentationml/2006/main">
+<p:sld xmlns:a="http://schemas.openxmlformats.org/drawingml/2006/main" xmlns:r="http://schemas.openxmlformats.org/officeDocument/2006/relationships" xmlns:mc="http://schemas.openxmlformats.org/markup-compatibility/2006" xmlns:mv="urn:schemas-microsoft-com:mac:vml" xmlns:p="http://schemas.openxmlformats.org/presentationml/2006/main" mc:Ignorable="mv" mc:PreserveAttributes="mv:*">
   <p:cSld>
     <p:bg>
       <p:bgPr>
@@ -3858,10 +3930,10 @@
           <p:cNvPr id="8" name="Rectangle 7">
             <a:extLst>
               <a:ext uri="{FF2B5EF4-FFF2-40B4-BE49-F238E27FC236}">
-                <a16:creationId xmlns:a16="http://schemas.microsoft.com/office/drawing/2014/main" id="{6753252F-4873-4F63-801D-CC719279A7D5}"/>
+                <a16:creationId xmlns:a16="http://schemas.microsoft.com/office/drawing/2014/main" xmlns:p="http://schemas.openxmlformats.org/presentationml/2006/main" xmlns:r="http://schemas.openxmlformats.org/officeDocument/2006/relationships" xmlns:a="http://schemas.openxmlformats.org/drawingml/2006/main" xmlns="" id="{6753252F-4873-4F63-801D-CC719279A7D5}"/>
               </a:ext>
               <a:ext uri="{C183D7F6-B498-43B3-948B-1728B52AA6E4}">
-                <adec:decorative xmlns:adec="http://schemas.microsoft.com/office/drawing/2017/decorative" val="1"/>
+                <adec:decorative xmlns:adec="http://schemas.microsoft.com/office/drawing/2017/decorative" xmlns:p="http://schemas.openxmlformats.org/presentationml/2006/main" xmlns:r="http://schemas.openxmlformats.org/officeDocument/2006/relationships" xmlns:a="http://schemas.openxmlformats.org/drawingml/2006/main" xmlns="" val="1"/>
               </a:ext>
             </a:extLst>
           </p:cNvPr>
@@ -3871,7 +3943,7 @@
           <p:nvPr>
             <p:extLst>
               <p:ext uri="{386F3935-93C4-4BCD-93E2-E3B085C9AB24}">
-                <p16:designElem xmlns:p16="http://schemas.microsoft.com/office/powerpoint/2015/main" val="1"/>
+                <p16:designElem xmlns:p16="http://schemas.microsoft.com/office/powerpoint/2015/main" xmlns:p="http://schemas.openxmlformats.org/presentationml/2006/main" xmlns:r="http://schemas.openxmlformats.org/officeDocument/2006/relationships" xmlns:a="http://schemas.openxmlformats.org/drawingml/2006/main" xmlns="" val="1"/>
               </p:ext>
             </p:extLst>
           </p:nvPr>
@@ -3921,10 +3993,10 @@
           <p:cNvPr id="10" name="Rectangle 9">
             <a:extLst>
               <a:ext uri="{FF2B5EF4-FFF2-40B4-BE49-F238E27FC236}">
-                <a16:creationId xmlns:a16="http://schemas.microsoft.com/office/drawing/2014/main" id="{047C8CCB-F95D-4249-92DD-651249D3535A}"/>
+                <a16:creationId xmlns:a16="http://schemas.microsoft.com/office/drawing/2014/main" xmlns:p="http://schemas.openxmlformats.org/presentationml/2006/main" xmlns:r="http://schemas.openxmlformats.org/officeDocument/2006/relationships" xmlns:a="http://schemas.openxmlformats.org/drawingml/2006/main" xmlns="" id="{047C8CCB-F95D-4249-92DD-651249D3535A}"/>
               </a:ext>
               <a:ext uri="{C183D7F6-B498-43B3-948B-1728B52AA6E4}">
-                <adec:decorative xmlns:adec="http://schemas.microsoft.com/office/drawing/2017/decorative" val="1"/>
+                <adec:decorative xmlns:adec="http://schemas.microsoft.com/office/drawing/2017/decorative" xmlns:p="http://schemas.openxmlformats.org/presentationml/2006/main" xmlns:r="http://schemas.openxmlformats.org/officeDocument/2006/relationships" xmlns:a="http://schemas.openxmlformats.org/drawingml/2006/main" xmlns="" val="1"/>
               </a:ext>
             </a:extLst>
           </p:cNvPr>
@@ -3934,7 +4006,7 @@
           <p:nvPr>
             <p:extLst>
               <p:ext uri="{386F3935-93C4-4BCD-93E2-E3B085C9AB24}">
-                <p16:designElem xmlns:p16="http://schemas.microsoft.com/office/powerpoint/2015/main" val="1"/>
+                <p16:designElem xmlns:p16="http://schemas.microsoft.com/office/powerpoint/2015/main" xmlns:p="http://schemas.openxmlformats.org/presentationml/2006/main" xmlns:r="http://schemas.openxmlformats.org/officeDocument/2006/relationships" xmlns:a="http://schemas.openxmlformats.org/drawingml/2006/main" xmlns="" val="1"/>
               </p:ext>
             </p:extLst>
           </p:nvPr>
@@ -3984,7 +4056,7 @@
           <p:cNvPr id="2" name="Title 1">
             <a:extLst>
               <a:ext uri="{FF2B5EF4-FFF2-40B4-BE49-F238E27FC236}">
-                <a16:creationId xmlns:a16="http://schemas.microsoft.com/office/drawing/2014/main" id="{58B1915D-44EE-42AE-8463-236B191AF404}"/>
+                <a16:creationId xmlns:a16="http://schemas.microsoft.com/office/drawing/2014/main" xmlns:p="http://schemas.openxmlformats.org/presentationml/2006/main" xmlns:r="http://schemas.openxmlformats.org/officeDocument/2006/relationships" xmlns:a="http://schemas.openxmlformats.org/drawingml/2006/main" xmlns="" id="{58B1915D-44EE-42AE-8463-236B191AF404}"/>
               </a:ext>
             </a:extLst>
           </p:cNvPr>
@@ -4041,7 +4113,7 @@
           <p:cNvPr id="4" name="Picture 3" descr="Shape&#10;&#10;Description automatically generated">
             <a:extLst>
               <a:ext uri="{FF2B5EF4-FFF2-40B4-BE49-F238E27FC236}">
-                <a16:creationId xmlns:a16="http://schemas.microsoft.com/office/drawing/2014/main" id="{EFA944F2-172A-4E34-B47F-CDE4E08FE630}"/>
+                <a16:creationId xmlns:a16="http://schemas.microsoft.com/office/drawing/2014/main" xmlns:p="http://schemas.openxmlformats.org/presentationml/2006/main" xmlns:r="http://schemas.openxmlformats.org/officeDocument/2006/relationships" xmlns:a="http://schemas.openxmlformats.org/drawingml/2006/main" xmlns="" id="{EFA944F2-172A-4E34-B47F-CDE4E08FE630}"/>
               </a:ext>
             </a:extLst>
           </p:cNvPr>
@@ -4071,7 +4143,7 @@
           <p:cNvPr id="5" name="Rectangle: Rounded Corners 4">
             <a:extLst>
               <a:ext uri="{FF2B5EF4-FFF2-40B4-BE49-F238E27FC236}">
-                <a16:creationId xmlns:a16="http://schemas.microsoft.com/office/drawing/2014/main" id="{478BD226-3B4A-4A07-8F35-5FD6F5A2AEFB}"/>
+                <a16:creationId xmlns:a16="http://schemas.microsoft.com/office/drawing/2014/main" xmlns:p="http://schemas.openxmlformats.org/presentationml/2006/main" xmlns:r="http://schemas.openxmlformats.org/officeDocument/2006/relationships" xmlns:a="http://schemas.openxmlformats.org/drawingml/2006/main" xmlns="" id="{478BD226-3B4A-4A07-8F35-5FD6F5A2AEFB}"/>
               </a:ext>
             </a:extLst>
           </p:cNvPr>
@@ -4120,7 +4192,7 @@
           <p:cNvPr id="9" name="Rectangle: Rounded Corners 8">
             <a:extLst>
               <a:ext uri="{FF2B5EF4-FFF2-40B4-BE49-F238E27FC236}">
-                <a16:creationId xmlns:a16="http://schemas.microsoft.com/office/drawing/2014/main" id="{A382FAE0-6AA4-4135-B944-29EEDDC40F47}"/>
+                <a16:creationId xmlns:a16="http://schemas.microsoft.com/office/drawing/2014/main" xmlns:p="http://schemas.openxmlformats.org/presentationml/2006/main" xmlns:r="http://schemas.openxmlformats.org/officeDocument/2006/relationships" xmlns:a="http://schemas.openxmlformats.org/drawingml/2006/main" xmlns="" id="{A382FAE0-6AA4-4135-B944-29EEDDC40F47}"/>
               </a:ext>
             </a:extLst>
           </p:cNvPr>
@@ -4170,7 +4242,7 @@
           <p:cNvPr id="7" name="Rectangle 6">
             <a:extLst>
               <a:ext uri="{FF2B5EF4-FFF2-40B4-BE49-F238E27FC236}">
-                <a16:creationId xmlns:a16="http://schemas.microsoft.com/office/drawing/2014/main" id="{2C1E5BFE-0C2C-4522-954F-8A4C01A1C1A1}"/>
+                <a16:creationId xmlns:a16="http://schemas.microsoft.com/office/drawing/2014/main" xmlns:p="http://schemas.openxmlformats.org/presentationml/2006/main" xmlns:r="http://schemas.openxmlformats.org/officeDocument/2006/relationships" xmlns:a="http://schemas.openxmlformats.org/drawingml/2006/main" xmlns="" id="{2C1E5BFE-0C2C-4522-954F-8A4C01A1C1A1}"/>
               </a:ext>
             </a:extLst>
           </p:cNvPr>
@@ -4220,7 +4292,7 @@
           <p:cNvPr id="12" name="Rectangle: Rounded Corners 11">
             <a:extLst>
               <a:ext uri="{FF2B5EF4-FFF2-40B4-BE49-F238E27FC236}">
-                <a16:creationId xmlns:a16="http://schemas.microsoft.com/office/drawing/2014/main" id="{F323F1A3-D049-4CDF-9ECB-8F39479918DA}"/>
+                <a16:creationId xmlns:a16="http://schemas.microsoft.com/office/drawing/2014/main" xmlns:p="http://schemas.openxmlformats.org/presentationml/2006/main" xmlns:r="http://schemas.openxmlformats.org/officeDocument/2006/relationships" xmlns:a="http://schemas.openxmlformats.org/drawingml/2006/main" xmlns="" id="{F323F1A3-D049-4CDF-9ECB-8F39479918DA}"/>
               </a:ext>
             </a:extLst>
           </p:cNvPr>
@@ -4270,7 +4342,7 @@
           <p:cNvPr id="13" name="Rectangle: Rounded Corners 12">
             <a:extLst>
               <a:ext uri="{FF2B5EF4-FFF2-40B4-BE49-F238E27FC236}">
-                <a16:creationId xmlns:a16="http://schemas.microsoft.com/office/drawing/2014/main" id="{AB36B8F2-027F-4989-9A03-E989819F8CD7}"/>
+                <a16:creationId xmlns:a16="http://schemas.microsoft.com/office/drawing/2014/main" xmlns:p="http://schemas.openxmlformats.org/presentationml/2006/main" xmlns:r="http://schemas.openxmlformats.org/officeDocument/2006/relationships" xmlns:a="http://schemas.openxmlformats.org/drawingml/2006/main" xmlns="" id="{AB36B8F2-027F-4989-9A03-E989819F8CD7}"/>
               </a:ext>
             </a:extLst>
           </p:cNvPr>
@@ -4320,7 +4392,7 @@
           <p:cNvPr id="15" name="Graphic 15" descr="Smiling face outline with solid fill">
             <a:extLst>
               <a:ext uri="{FF2B5EF4-FFF2-40B4-BE49-F238E27FC236}">
-                <a16:creationId xmlns:a16="http://schemas.microsoft.com/office/drawing/2014/main" id="{AC086776-D9CA-49C4-84E2-2A7C23C74D86}"/>
+                <a16:creationId xmlns:a16="http://schemas.microsoft.com/office/drawing/2014/main" xmlns:p="http://schemas.openxmlformats.org/presentationml/2006/main" xmlns:r="http://schemas.openxmlformats.org/officeDocument/2006/relationships" xmlns:a="http://schemas.openxmlformats.org/drawingml/2006/main" xmlns="" id="{AC086776-D9CA-49C4-84E2-2A7C23C74D86}"/>
               </a:ext>
             </a:extLst>
           </p:cNvPr>
@@ -4333,7 +4405,7 @@
           <a:blip r:embed="rId4">
             <a:extLst>
               <a:ext uri="{96DAC541-7B7A-43D3-8B79-37D633B846F1}">
-                <asvg:svgBlip xmlns:asvg="http://schemas.microsoft.com/office/drawing/2016/SVG/main" r:embed="rId5"/>
+                <asvg:svgBlip xmlns:asvg="http://schemas.microsoft.com/office/drawing/2016/SVG/main" xmlns:p="http://schemas.openxmlformats.org/presentationml/2006/main" xmlns:r="http://schemas.openxmlformats.org/officeDocument/2006/relationships" xmlns:a="http://schemas.openxmlformats.org/drawingml/2006/main" xmlns="" r:embed="rId5"/>
               </a:ext>
             </a:extLst>
           </a:blip>
@@ -4356,7 +4428,7 @@
           <p:cNvPr id="16" name="Rectangle: Rounded Corners 15">
             <a:extLst>
               <a:ext uri="{FF2B5EF4-FFF2-40B4-BE49-F238E27FC236}">
-                <a16:creationId xmlns:a16="http://schemas.microsoft.com/office/drawing/2014/main" id="{269775A5-E0FF-4582-9F9E-2FFE675FFF8D}"/>
+                <a16:creationId xmlns:a16="http://schemas.microsoft.com/office/drawing/2014/main" xmlns:p="http://schemas.openxmlformats.org/presentationml/2006/main" xmlns:r="http://schemas.openxmlformats.org/officeDocument/2006/relationships" xmlns:a="http://schemas.openxmlformats.org/drawingml/2006/main" xmlns="" id="{269775A5-E0FF-4582-9F9E-2FFE675FFF8D}"/>
               </a:ext>
             </a:extLst>
           </p:cNvPr>
@@ -4405,7 +4477,7 @@
           <p:cNvPr id="20" name="Rectangle: Rounded Corners 19">
             <a:extLst>
               <a:ext uri="{FF2B5EF4-FFF2-40B4-BE49-F238E27FC236}">
-                <a16:creationId xmlns:a16="http://schemas.microsoft.com/office/drawing/2014/main" id="{4F0FE155-3E05-4449-8555-085318654A4A}"/>
+                <a16:creationId xmlns:a16="http://schemas.microsoft.com/office/drawing/2014/main" xmlns:p="http://schemas.openxmlformats.org/presentationml/2006/main" xmlns:r="http://schemas.openxmlformats.org/officeDocument/2006/relationships" xmlns:a="http://schemas.openxmlformats.org/drawingml/2006/main" xmlns="" id="{4F0FE155-3E05-4449-8555-085318654A4A}"/>
               </a:ext>
             </a:extLst>
           </p:cNvPr>
@@ -4454,7 +4526,7 @@
           <p:cNvPr id="21" name="Rectangle: Rounded Corners 20">
             <a:extLst>
               <a:ext uri="{FF2B5EF4-FFF2-40B4-BE49-F238E27FC236}">
-                <a16:creationId xmlns:a16="http://schemas.microsoft.com/office/drawing/2014/main" id="{03F04575-6624-4478-A5C4-12132E1E27BF}"/>
+                <a16:creationId xmlns:a16="http://schemas.microsoft.com/office/drawing/2014/main" xmlns:p="http://schemas.openxmlformats.org/presentationml/2006/main" xmlns:r="http://schemas.openxmlformats.org/officeDocument/2006/relationships" xmlns:a="http://schemas.openxmlformats.org/drawingml/2006/main" xmlns="" id="{03F04575-6624-4478-A5C4-12132E1E27BF}"/>
               </a:ext>
             </a:extLst>
           </p:cNvPr>
@@ -4512,7 +4584,7 @@
           <p:cNvPr id="23" name="Rectangle: Rounded Corners 22">
             <a:extLst>
               <a:ext uri="{FF2B5EF4-FFF2-40B4-BE49-F238E27FC236}">
-                <a16:creationId xmlns:a16="http://schemas.microsoft.com/office/drawing/2014/main" id="{5D11FB27-6D53-4243-A453-676F1F7C8CED}"/>
+                <a16:creationId xmlns:a16="http://schemas.microsoft.com/office/drawing/2014/main" xmlns:p="http://schemas.openxmlformats.org/presentationml/2006/main" xmlns:r="http://schemas.openxmlformats.org/officeDocument/2006/relationships" xmlns:a="http://schemas.openxmlformats.org/drawingml/2006/main" xmlns="" id="{5D11FB27-6D53-4243-A453-676F1F7C8CED}"/>
               </a:ext>
             </a:extLst>
           </p:cNvPr>
@@ -4570,7 +4642,7 @@
           <p:cNvPr id="24" name="Rectangle: Rounded Corners 23">
             <a:extLst>
               <a:ext uri="{FF2B5EF4-FFF2-40B4-BE49-F238E27FC236}">
-                <a16:creationId xmlns:a16="http://schemas.microsoft.com/office/drawing/2014/main" id="{E384BB1D-79B4-429B-8522-592235832850}"/>
+                <a16:creationId xmlns:a16="http://schemas.microsoft.com/office/drawing/2014/main" xmlns:p="http://schemas.openxmlformats.org/presentationml/2006/main" xmlns:r="http://schemas.openxmlformats.org/officeDocument/2006/relationships" xmlns:a="http://schemas.openxmlformats.org/drawingml/2006/main" xmlns="" id="{E384BB1D-79B4-429B-8522-592235832850}"/>
               </a:ext>
             </a:extLst>
           </p:cNvPr>
@@ -4620,7 +4692,7 @@
           <p:cNvPr id="25" name="Graphic 15" descr="Smiling face outline with solid fill">
             <a:extLst>
               <a:ext uri="{FF2B5EF4-FFF2-40B4-BE49-F238E27FC236}">
-                <a16:creationId xmlns:a16="http://schemas.microsoft.com/office/drawing/2014/main" id="{3DF293DE-ADE2-44E8-BE6A-A49BF3D33E22}"/>
+                <a16:creationId xmlns:a16="http://schemas.microsoft.com/office/drawing/2014/main" xmlns:p="http://schemas.openxmlformats.org/presentationml/2006/main" xmlns:r="http://schemas.openxmlformats.org/officeDocument/2006/relationships" xmlns:a="http://schemas.openxmlformats.org/drawingml/2006/main" xmlns="" id="{3DF293DE-ADE2-44E8-BE6A-A49BF3D33E22}"/>
               </a:ext>
             </a:extLst>
           </p:cNvPr>
@@ -4633,7 +4705,7 @@
           <a:blip r:embed="rId4">
             <a:extLst>
               <a:ext uri="{96DAC541-7B7A-43D3-8B79-37D633B846F1}">
-                <asvg:svgBlip xmlns:asvg="http://schemas.microsoft.com/office/drawing/2016/SVG/main" r:embed="rId5"/>
+                <asvg:svgBlip xmlns:asvg="http://schemas.microsoft.com/office/drawing/2016/SVG/main" xmlns:p="http://schemas.openxmlformats.org/presentationml/2006/main" xmlns:r="http://schemas.openxmlformats.org/officeDocument/2006/relationships" xmlns:a="http://schemas.openxmlformats.org/drawingml/2006/main" xmlns="" r:embed="rId5"/>
               </a:ext>
             </a:extLst>
           </a:blip>
@@ -4656,7 +4728,7 @@
           <p:cNvPr id="26" name="Rectangle: Rounded Corners 25">
             <a:extLst>
               <a:ext uri="{FF2B5EF4-FFF2-40B4-BE49-F238E27FC236}">
-                <a16:creationId xmlns:a16="http://schemas.microsoft.com/office/drawing/2014/main" id="{B9751E74-F1F3-405C-983D-26DD43DB710F}"/>
+                <a16:creationId xmlns:a16="http://schemas.microsoft.com/office/drawing/2014/main" xmlns:p="http://schemas.openxmlformats.org/presentationml/2006/main" xmlns:r="http://schemas.openxmlformats.org/officeDocument/2006/relationships" xmlns:a="http://schemas.openxmlformats.org/drawingml/2006/main" xmlns="" id="{B9751E74-F1F3-405C-983D-26DD43DB710F}"/>
               </a:ext>
             </a:extLst>
           </p:cNvPr>
@@ -4706,7 +4778,7 @@
           <p:cNvPr id="27" name="Rectangle: Rounded Corners 26">
             <a:extLst>
               <a:ext uri="{FF2B5EF4-FFF2-40B4-BE49-F238E27FC236}">
-                <a16:creationId xmlns:a16="http://schemas.microsoft.com/office/drawing/2014/main" id="{1EB35ADA-D7BD-4991-97BC-01E9AE072DED}"/>
+                <a16:creationId xmlns:a16="http://schemas.microsoft.com/office/drawing/2014/main" xmlns:p="http://schemas.openxmlformats.org/presentationml/2006/main" xmlns:r="http://schemas.openxmlformats.org/officeDocument/2006/relationships" xmlns:a="http://schemas.openxmlformats.org/drawingml/2006/main" xmlns="" id="{1EB35ADA-D7BD-4991-97BC-01E9AE072DED}"/>
               </a:ext>
             </a:extLst>
           </p:cNvPr>
@@ -4764,7 +4836,7 @@
           <p:cNvPr id="28" name="Rectangle: Rounded Corners 27">
             <a:extLst>
               <a:ext uri="{FF2B5EF4-FFF2-40B4-BE49-F238E27FC236}">
-                <a16:creationId xmlns:a16="http://schemas.microsoft.com/office/drawing/2014/main" id="{057C44D4-B2EA-406A-98B4-21083088750D}"/>
+                <a16:creationId xmlns:a16="http://schemas.microsoft.com/office/drawing/2014/main" xmlns:p="http://schemas.openxmlformats.org/presentationml/2006/main" xmlns:r="http://schemas.openxmlformats.org/officeDocument/2006/relationships" xmlns:a="http://schemas.openxmlformats.org/drawingml/2006/main" xmlns="" id="{057C44D4-B2EA-406A-98B4-21083088750D}"/>
               </a:ext>
             </a:extLst>
           </p:cNvPr>
@@ -4813,7 +4885,7 @@
           <p:cNvPr id="29" name="Rectangle: Rounded Corners 28">
             <a:extLst>
               <a:ext uri="{FF2B5EF4-FFF2-40B4-BE49-F238E27FC236}">
-                <a16:creationId xmlns:a16="http://schemas.microsoft.com/office/drawing/2014/main" id="{6880EA6F-E2A0-4249-87D3-965AFF5D98C4}"/>
+                <a16:creationId xmlns:a16="http://schemas.microsoft.com/office/drawing/2014/main" xmlns:p="http://schemas.openxmlformats.org/presentationml/2006/main" xmlns:r="http://schemas.openxmlformats.org/officeDocument/2006/relationships" xmlns:a="http://schemas.openxmlformats.org/drawingml/2006/main" xmlns="" id="{6880EA6F-E2A0-4249-87D3-965AFF5D98C4}"/>
               </a:ext>
             </a:extLst>
           </p:cNvPr>
@@ -4860,7 +4932,7 @@
     </p:spTree>
     <p:extLst>
       <p:ext uri="{BB962C8B-B14F-4D97-AF65-F5344CB8AC3E}">
-        <p14:creationId xmlns:p14="http://schemas.microsoft.com/office/powerpoint/2010/main" val="3388065515"/>
+        <p14:creationId xmlns:p14="http://schemas.microsoft.com/office/powerpoint/2010/main" xmlns:p="http://schemas.openxmlformats.org/presentationml/2006/main" xmlns:r="http://schemas.openxmlformats.org/officeDocument/2006/relationships" xmlns:a="http://schemas.openxmlformats.org/drawingml/2006/main" xmlns="" val="3388065515"/>
       </p:ext>
     </p:extLst>
   </p:cSld>
@@ -4871,7 +4943,7 @@
 </file>
 
 <file path=ppt/slides/slide2.xml><?xml version="1.0" encoding="utf-8"?>
-<p:sld xmlns:a="http://schemas.openxmlformats.org/drawingml/2006/main" xmlns:r="http://schemas.openxmlformats.org/officeDocument/2006/relationships" xmlns:p="http://schemas.openxmlformats.org/presentationml/2006/main">
+<p:sld xmlns:a="http://schemas.openxmlformats.org/drawingml/2006/main" xmlns:r="http://schemas.openxmlformats.org/officeDocument/2006/relationships" xmlns:mc="http://schemas.openxmlformats.org/markup-compatibility/2006" xmlns:mv="urn:schemas-microsoft-com:mac:vml" xmlns:p="http://schemas.openxmlformats.org/presentationml/2006/main" mc:Ignorable="mv" mc:PreserveAttributes="mv:*">
   <p:cSld>
     <p:bg>
       <p:bgPr>
@@ -4900,10 +4972,10 @@
           <p:cNvPr id="8" name="Rectangle 7">
             <a:extLst>
               <a:ext uri="{FF2B5EF4-FFF2-40B4-BE49-F238E27FC236}">
-                <a16:creationId xmlns:a16="http://schemas.microsoft.com/office/drawing/2014/main" id="{6753252F-4873-4F63-801D-CC719279A7D5}"/>
+                <a16:creationId xmlns:a16="http://schemas.microsoft.com/office/drawing/2014/main" xmlns:p="http://schemas.openxmlformats.org/presentationml/2006/main" xmlns:r="http://schemas.openxmlformats.org/officeDocument/2006/relationships" xmlns:a="http://schemas.openxmlformats.org/drawingml/2006/main" xmlns="" id="{6753252F-4873-4F63-801D-CC719279A7D5}"/>
               </a:ext>
               <a:ext uri="{C183D7F6-B498-43B3-948B-1728B52AA6E4}">
-                <adec:decorative xmlns:adec="http://schemas.microsoft.com/office/drawing/2017/decorative" val="1"/>
+                <adec:decorative xmlns:adec="http://schemas.microsoft.com/office/drawing/2017/decorative" xmlns:p="http://schemas.openxmlformats.org/presentationml/2006/main" xmlns:r="http://schemas.openxmlformats.org/officeDocument/2006/relationships" xmlns:a="http://schemas.openxmlformats.org/drawingml/2006/main" xmlns="" val="1"/>
               </a:ext>
             </a:extLst>
           </p:cNvPr>
@@ -4913,7 +4985,7 @@
           <p:nvPr>
             <p:extLst>
               <p:ext uri="{386F3935-93C4-4BCD-93E2-E3B085C9AB24}">
-                <p16:designElem xmlns:p16="http://schemas.microsoft.com/office/powerpoint/2015/main" val="1"/>
+                <p16:designElem xmlns:p16="http://schemas.microsoft.com/office/powerpoint/2015/main" xmlns:p="http://schemas.openxmlformats.org/presentationml/2006/main" xmlns:r="http://schemas.openxmlformats.org/officeDocument/2006/relationships" xmlns:a="http://schemas.openxmlformats.org/drawingml/2006/main" xmlns="" val="1"/>
               </p:ext>
             </p:extLst>
           </p:nvPr>
@@ -4963,10 +5035,10 @@
           <p:cNvPr id="10" name="Rectangle 9">
             <a:extLst>
               <a:ext uri="{FF2B5EF4-FFF2-40B4-BE49-F238E27FC236}">
-                <a16:creationId xmlns:a16="http://schemas.microsoft.com/office/drawing/2014/main" id="{047C8CCB-F95D-4249-92DD-651249D3535A}"/>
+                <a16:creationId xmlns:a16="http://schemas.microsoft.com/office/drawing/2014/main" xmlns:p="http://schemas.openxmlformats.org/presentationml/2006/main" xmlns:r="http://schemas.openxmlformats.org/officeDocument/2006/relationships" xmlns:a="http://schemas.openxmlformats.org/drawingml/2006/main" xmlns="" id="{047C8CCB-F95D-4249-92DD-651249D3535A}"/>
               </a:ext>
               <a:ext uri="{C183D7F6-B498-43B3-948B-1728B52AA6E4}">
-                <adec:decorative xmlns:adec="http://schemas.microsoft.com/office/drawing/2017/decorative" val="1"/>
+                <adec:decorative xmlns:adec="http://schemas.microsoft.com/office/drawing/2017/decorative" xmlns:p="http://schemas.openxmlformats.org/presentationml/2006/main" xmlns:r="http://schemas.openxmlformats.org/officeDocument/2006/relationships" xmlns:a="http://schemas.openxmlformats.org/drawingml/2006/main" xmlns="" val="1"/>
               </a:ext>
             </a:extLst>
           </p:cNvPr>
@@ -4976,7 +5048,7 @@
           <p:nvPr>
             <p:extLst>
               <p:ext uri="{386F3935-93C4-4BCD-93E2-E3B085C9AB24}">
-                <p16:designElem xmlns:p16="http://schemas.microsoft.com/office/powerpoint/2015/main" val="1"/>
+                <p16:designElem xmlns:p16="http://schemas.microsoft.com/office/powerpoint/2015/main" xmlns:p="http://schemas.openxmlformats.org/presentationml/2006/main" xmlns:r="http://schemas.openxmlformats.org/officeDocument/2006/relationships" xmlns:a="http://schemas.openxmlformats.org/drawingml/2006/main" xmlns="" val="1"/>
               </p:ext>
             </p:extLst>
           </p:nvPr>
@@ -5026,7 +5098,7 @@
           <p:cNvPr id="2" name="Title 1">
             <a:extLst>
               <a:ext uri="{FF2B5EF4-FFF2-40B4-BE49-F238E27FC236}">
-                <a16:creationId xmlns:a16="http://schemas.microsoft.com/office/drawing/2014/main" id="{58B1915D-44EE-42AE-8463-236B191AF404}"/>
+                <a16:creationId xmlns:a16="http://schemas.microsoft.com/office/drawing/2014/main" xmlns:p="http://schemas.openxmlformats.org/presentationml/2006/main" xmlns:r="http://schemas.openxmlformats.org/officeDocument/2006/relationships" xmlns:a="http://schemas.openxmlformats.org/drawingml/2006/main" xmlns="" id="{58B1915D-44EE-42AE-8463-236B191AF404}"/>
               </a:ext>
             </a:extLst>
           </p:cNvPr>
@@ -5091,7 +5163,7 @@
           <p:cNvPr id="4" name="Picture 3" descr="Shape&#10;&#10;Description automatically generated">
             <a:extLst>
               <a:ext uri="{FF2B5EF4-FFF2-40B4-BE49-F238E27FC236}">
-                <a16:creationId xmlns:a16="http://schemas.microsoft.com/office/drawing/2014/main" id="{EFA944F2-172A-4E34-B47F-CDE4E08FE630}"/>
+                <a16:creationId xmlns:a16="http://schemas.microsoft.com/office/drawing/2014/main" xmlns:p="http://schemas.openxmlformats.org/presentationml/2006/main" xmlns:r="http://schemas.openxmlformats.org/officeDocument/2006/relationships" xmlns:a="http://schemas.openxmlformats.org/drawingml/2006/main" xmlns="" id="{EFA944F2-172A-4E34-B47F-CDE4E08FE630}"/>
               </a:ext>
             </a:extLst>
           </p:cNvPr>
@@ -5121,7 +5193,7 @@
           <p:cNvPr id="3" name="Rectangle: Rounded Corners 2">
             <a:extLst>
               <a:ext uri="{FF2B5EF4-FFF2-40B4-BE49-F238E27FC236}">
-                <a16:creationId xmlns:a16="http://schemas.microsoft.com/office/drawing/2014/main" id="{E888F11D-FABC-4602-B577-6C14AFBB075C}"/>
+                <a16:creationId xmlns:a16="http://schemas.microsoft.com/office/drawing/2014/main" xmlns:p="http://schemas.openxmlformats.org/presentationml/2006/main" xmlns:r="http://schemas.openxmlformats.org/officeDocument/2006/relationships" xmlns:a="http://schemas.openxmlformats.org/drawingml/2006/main" xmlns="" id="{E888F11D-FABC-4602-B577-6C14AFBB075C}"/>
               </a:ext>
             </a:extLst>
           </p:cNvPr>
@@ -5170,7 +5242,7 @@
           <p:cNvPr id="5" name="Rectangle: Rounded Corners 4">
             <a:extLst>
               <a:ext uri="{FF2B5EF4-FFF2-40B4-BE49-F238E27FC236}">
-                <a16:creationId xmlns:a16="http://schemas.microsoft.com/office/drawing/2014/main" id="{CD16F22F-3A9E-4124-AAF2-2C4A3CB1390C}"/>
+                <a16:creationId xmlns:a16="http://schemas.microsoft.com/office/drawing/2014/main" xmlns:p="http://schemas.openxmlformats.org/presentationml/2006/main" xmlns:r="http://schemas.openxmlformats.org/officeDocument/2006/relationships" xmlns:a="http://schemas.openxmlformats.org/drawingml/2006/main" xmlns="" id="{CD16F22F-3A9E-4124-AAF2-2C4A3CB1390C}"/>
               </a:ext>
             </a:extLst>
           </p:cNvPr>
@@ -5220,7 +5292,7 @@
           <p:cNvPr id="7" name="Rectangle 6">
             <a:extLst>
               <a:ext uri="{FF2B5EF4-FFF2-40B4-BE49-F238E27FC236}">
-                <a16:creationId xmlns:a16="http://schemas.microsoft.com/office/drawing/2014/main" id="{F3E5F7AB-8C19-43CF-AA20-445DE710A698}"/>
+                <a16:creationId xmlns:a16="http://schemas.microsoft.com/office/drawing/2014/main" xmlns:p="http://schemas.openxmlformats.org/presentationml/2006/main" xmlns:r="http://schemas.openxmlformats.org/officeDocument/2006/relationships" xmlns:a="http://schemas.openxmlformats.org/drawingml/2006/main" xmlns="" id="{F3E5F7AB-8C19-43CF-AA20-445DE710A698}"/>
               </a:ext>
             </a:extLst>
           </p:cNvPr>
@@ -5270,7 +5342,7 @@
           <p:cNvPr id="13" name="Rectangle: Rounded Corners 12">
             <a:extLst>
               <a:ext uri="{FF2B5EF4-FFF2-40B4-BE49-F238E27FC236}">
-                <a16:creationId xmlns:a16="http://schemas.microsoft.com/office/drawing/2014/main" id="{8FC9CF73-09B4-438B-8C37-118BB1763365}"/>
+                <a16:creationId xmlns:a16="http://schemas.microsoft.com/office/drawing/2014/main" xmlns:p="http://schemas.openxmlformats.org/presentationml/2006/main" xmlns:r="http://schemas.openxmlformats.org/officeDocument/2006/relationships" xmlns:a="http://schemas.openxmlformats.org/drawingml/2006/main" xmlns="" id="{8FC9CF73-09B4-438B-8C37-118BB1763365}"/>
               </a:ext>
             </a:extLst>
           </p:cNvPr>
@@ -5320,7 +5392,7 @@
           <p:cNvPr id="15" name="Rectangle: Rounded Corners 14">
             <a:extLst>
               <a:ext uri="{FF2B5EF4-FFF2-40B4-BE49-F238E27FC236}">
-                <a16:creationId xmlns:a16="http://schemas.microsoft.com/office/drawing/2014/main" id="{ADCE0968-5166-451E-864D-F71F00E44C3A}"/>
+                <a16:creationId xmlns:a16="http://schemas.microsoft.com/office/drawing/2014/main" xmlns:p="http://schemas.openxmlformats.org/presentationml/2006/main" xmlns:r="http://schemas.openxmlformats.org/officeDocument/2006/relationships" xmlns:a="http://schemas.openxmlformats.org/drawingml/2006/main" xmlns="" id="{ADCE0968-5166-451E-864D-F71F00E44C3A}"/>
               </a:ext>
             </a:extLst>
           </p:cNvPr>
@@ -5370,7 +5442,7 @@
           <p:cNvPr id="17" name="Graphic 15" descr="Smiling face outline with solid fill">
             <a:extLst>
               <a:ext uri="{FF2B5EF4-FFF2-40B4-BE49-F238E27FC236}">
-                <a16:creationId xmlns:a16="http://schemas.microsoft.com/office/drawing/2014/main" id="{D3D55673-80AC-4243-9C03-C4322CE845F1}"/>
+                <a16:creationId xmlns:a16="http://schemas.microsoft.com/office/drawing/2014/main" xmlns:p="http://schemas.openxmlformats.org/presentationml/2006/main" xmlns:r="http://schemas.openxmlformats.org/officeDocument/2006/relationships" xmlns:a="http://schemas.openxmlformats.org/drawingml/2006/main" xmlns="" id="{D3D55673-80AC-4243-9C03-C4322CE845F1}"/>
               </a:ext>
             </a:extLst>
           </p:cNvPr>
@@ -5383,7 +5455,7 @@
           <a:blip r:embed="rId3">
             <a:extLst>
               <a:ext uri="{96DAC541-7B7A-43D3-8B79-37D633B846F1}">
-                <asvg:svgBlip xmlns:asvg="http://schemas.microsoft.com/office/drawing/2016/SVG/main" r:embed="rId4"/>
+                <asvg:svgBlip xmlns:asvg="http://schemas.microsoft.com/office/drawing/2016/SVG/main" xmlns:p="http://schemas.openxmlformats.org/presentationml/2006/main" xmlns:r="http://schemas.openxmlformats.org/officeDocument/2006/relationships" xmlns:a="http://schemas.openxmlformats.org/drawingml/2006/main" xmlns="" r:embed="rId4"/>
               </a:ext>
             </a:extLst>
           </a:blip>
@@ -5406,7 +5478,7 @@
           <p:cNvPr id="19" name="Rectangle: Rounded Corners 18">
             <a:extLst>
               <a:ext uri="{FF2B5EF4-FFF2-40B4-BE49-F238E27FC236}">
-                <a16:creationId xmlns:a16="http://schemas.microsoft.com/office/drawing/2014/main" id="{F20B71FB-F909-4F76-B124-F326729EB115}"/>
+                <a16:creationId xmlns:a16="http://schemas.microsoft.com/office/drawing/2014/main" xmlns:p="http://schemas.openxmlformats.org/presentationml/2006/main" xmlns:r="http://schemas.openxmlformats.org/officeDocument/2006/relationships" xmlns:a="http://schemas.openxmlformats.org/drawingml/2006/main" xmlns="" id="{F20B71FB-F909-4F76-B124-F326729EB115}"/>
               </a:ext>
             </a:extLst>
           </p:cNvPr>
@@ -5456,7 +5528,7 @@
           <p:cNvPr id="21" name="Graphic 15" descr="Smiling face outline with solid fill">
             <a:extLst>
               <a:ext uri="{FF2B5EF4-FFF2-40B4-BE49-F238E27FC236}">
-                <a16:creationId xmlns:a16="http://schemas.microsoft.com/office/drawing/2014/main" id="{E35ED242-81EA-4CB9-BB60-8B9B344458A0}"/>
+                <a16:creationId xmlns:a16="http://schemas.microsoft.com/office/drawing/2014/main" xmlns:p="http://schemas.openxmlformats.org/presentationml/2006/main" xmlns:r="http://schemas.openxmlformats.org/officeDocument/2006/relationships" xmlns:a="http://schemas.openxmlformats.org/drawingml/2006/main" xmlns="" id="{E35ED242-81EA-4CB9-BB60-8B9B344458A0}"/>
               </a:ext>
             </a:extLst>
           </p:cNvPr>
@@ -5469,7 +5541,7 @@
           <a:blip r:embed="rId3">
             <a:extLst>
               <a:ext uri="{96DAC541-7B7A-43D3-8B79-37D633B846F1}">
-                <asvg:svgBlip xmlns:asvg="http://schemas.microsoft.com/office/drawing/2016/SVG/main" r:embed="rId4"/>
+                <asvg:svgBlip xmlns:asvg="http://schemas.microsoft.com/office/drawing/2016/SVG/main" xmlns:p="http://schemas.openxmlformats.org/presentationml/2006/main" xmlns:r="http://schemas.openxmlformats.org/officeDocument/2006/relationships" xmlns:a="http://schemas.openxmlformats.org/drawingml/2006/main" xmlns="" r:embed="rId4"/>
               </a:ext>
             </a:extLst>
           </a:blip>
@@ -5492,7 +5564,7 @@
           <p:cNvPr id="22" name="Table 22">
             <a:extLst>
               <a:ext uri="{FF2B5EF4-FFF2-40B4-BE49-F238E27FC236}">
-                <a16:creationId xmlns:a16="http://schemas.microsoft.com/office/drawing/2014/main" id="{9801588F-BDF2-43DE-B1B6-9042C4D808A8}"/>
+                <a16:creationId xmlns:a16="http://schemas.microsoft.com/office/drawing/2014/main" xmlns:p="http://schemas.openxmlformats.org/presentationml/2006/main" xmlns:r="http://schemas.openxmlformats.org/officeDocument/2006/relationships" xmlns:a="http://schemas.openxmlformats.org/drawingml/2006/main" xmlns="" id="{9801588F-BDF2-43DE-B1B6-9042C4D808A8}"/>
               </a:ext>
             </a:extLst>
           </p:cNvPr>
@@ -5502,7 +5574,7 @@
           <p:nvPr>
             <p:extLst>
               <p:ext uri="{D42A27DB-BD31-4B8C-83A1-F6EECF244321}">
-                <p14:modId xmlns:p14="http://schemas.microsoft.com/office/powerpoint/2010/main" val="3354176180"/>
+                <p14:modId xmlns:p14="http://schemas.microsoft.com/office/powerpoint/2010/main" xmlns:p="http://schemas.openxmlformats.org/presentationml/2006/main" xmlns:r="http://schemas.openxmlformats.org/officeDocument/2006/relationships" xmlns:a="http://schemas.openxmlformats.org/drawingml/2006/main" xmlns="" val="3354176180"/>
               </p:ext>
             </p:extLst>
           </p:nvPr>
@@ -5521,21 +5593,21 @@
                 <a:gridCol w="753626">
                   <a:extLst>
                     <a:ext uri="{9D8B030D-6E8A-4147-A177-3AD203B41FA5}">
-                      <a16:colId xmlns:a16="http://schemas.microsoft.com/office/drawing/2014/main" val="3097614736"/>
+                      <a16:colId xmlns:a16="http://schemas.microsoft.com/office/drawing/2014/main" xmlns:p="http://schemas.openxmlformats.org/presentationml/2006/main" xmlns:r="http://schemas.openxmlformats.org/officeDocument/2006/relationships" xmlns:a="http://schemas.openxmlformats.org/drawingml/2006/main" xmlns="" val="3097614736"/>
                     </a:ext>
                   </a:extLst>
                 </a:gridCol>
                 <a:gridCol w="538092">
                   <a:extLst>
                     <a:ext uri="{9D8B030D-6E8A-4147-A177-3AD203B41FA5}">
-                      <a16:colId xmlns:a16="http://schemas.microsoft.com/office/drawing/2014/main" val="3350224573"/>
+                      <a16:colId xmlns:a16="http://schemas.microsoft.com/office/drawing/2014/main" xmlns:p="http://schemas.openxmlformats.org/presentationml/2006/main" xmlns:r="http://schemas.openxmlformats.org/officeDocument/2006/relationships" xmlns:a="http://schemas.openxmlformats.org/drawingml/2006/main" xmlns="" val="3350224573"/>
                     </a:ext>
                   </a:extLst>
                 </a:gridCol>
                 <a:gridCol w="523530">
                   <a:extLst>
                     <a:ext uri="{9D8B030D-6E8A-4147-A177-3AD203B41FA5}">
-                      <a16:colId xmlns:a16="http://schemas.microsoft.com/office/drawing/2014/main" val="1130133638"/>
+                      <a16:colId xmlns:a16="http://schemas.microsoft.com/office/drawing/2014/main" xmlns:p="http://schemas.openxmlformats.org/presentationml/2006/main" xmlns:r="http://schemas.openxmlformats.org/officeDocument/2006/relationships" xmlns:a="http://schemas.openxmlformats.org/drawingml/2006/main" xmlns="" val="1130133638"/>
                     </a:ext>
                   </a:extLst>
                 </a:gridCol>
@@ -5586,7 +5658,7 @@
                 </a:tc>
                 <a:extLst>
                   <a:ext uri="{0D108BD9-81ED-4DB2-BD59-A6C34878D82A}">
-                    <a16:rowId xmlns:a16="http://schemas.microsoft.com/office/drawing/2014/main" val="81401580"/>
+                    <a16:rowId xmlns:a16="http://schemas.microsoft.com/office/drawing/2014/main" xmlns:p="http://schemas.openxmlformats.org/presentationml/2006/main" xmlns:r="http://schemas.openxmlformats.org/officeDocument/2006/relationships" xmlns:a="http://schemas.openxmlformats.org/drawingml/2006/main" xmlns="" val="81401580"/>
                   </a:ext>
                 </a:extLst>
               </a:tr>
@@ -5623,7 +5695,7 @@
                 </a:tc>
                 <a:extLst>
                   <a:ext uri="{0D108BD9-81ED-4DB2-BD59-A6C34878D82A}">
-                    <a16:rowId xmlns:a16="http://schemas.microsoft.com/office/drawing/2014/main" val="25104109"/>
+                    <a16:rowId xmlns:a16="http://schemas.microsoft.com/office/drawing/2014/main" xmlns:p="http://schemas.openxmlformats.org/presentationml/2006/main" xmlns:r="http://schemas.openxmlformats.org/officeDocument/2006/relationships" xmlns:a="http://schemas.openxmlformats.org/drawingml/2006/main" xmlns="" val="25104109"/>
                   </a:ext>
                 </a:extLst>
               </a:tr>
@@ -5660,7 +5732,7 @@
                 </a:tc>
                 <a:extLst>
                   <a:ext uri="{0D108BD9-81ED-4DB2-BD59-A6C34878D82A}">
-                    <a16:rowId xmlns:a16="http://schemas.microsoft.com/office/drawing/2014/main" val="3370608929"/>
+                    <a16:rowId xmlns:a16="http://schemas.microsoft.com/office/drawing/2014/main" xmlns:p="http://schemas.openxmlformats.org/presentationml/2006/main" xmlns:r="http://schemas.openxmlformats.org/officeDocument/2006/relationships" xmlns:a="http://schemas.openxmlformats.org/drawingml/2006/main" xmlns="" val="3370608929"/>
                   </a:ext>
                 </a:extLst>
               </a:tr>
@@ -5697,7 +5769,7 @@
                 </a:tc>
                 <a:extLst>
                   <a:ext uri="{0D108BD9-81ED-4DB2-BD59-A6C34878D82A}">
-                    <a16:rowId xmlns:a16="http://schemas.microsoft.com/office/drawing/2014/main" val="1674773855"/>
+                    <a16:rowId xmlns:a16="http://schemas.microsoft.com/office/drawing/2014/main" xmlns:p="http://schemas.openxmlformats.org/presentationml/2006/main" xmlns:r="http://schemas.openxmlformats.org/officeDocument/2006/relationships" xmlns:a="http://schemas.openxmlformats.org/drawingml/2006/main" xmlns="" val="1674773855"/>
                   </a:ext>
                 </a:extLst>
               </a:tr>
@@ -5743,7 +5815,7 @@
                 </a:tc>
                 <a:extLst>
                   <a:ext uri="{0D108BD9-81ED-4DB2-BD59-A6C34878D82A}">
-                    <a16:rowId xmlns:a16="http://schemas.microsoft.com/office/drawing/2014/main" val="1624446002"/>
+                    <a16:rowId xmlns:a16="http://schemas.microsoft.com/office/drawing/2014/main" xmlns:p="http://schemas.openxmlformats.org/presentationml/2006/main" xmlns:r="http://schemas.openxmlformats.org/officeDocument/2006/relationships" xmlns:a="http://schemas.openxmlformats.org/drawingml/2006/main" xmlns="" val="1624446002"/>
                   </a:ext>
                 </a:extLst>
               </a:tr>
@@ -5789,7 +5861,7 @@
                 </a:tc>
                 <a:extLst>
                   <a:ext uri="{0D108BD9-81ED-4DB2-BD59-A6C34878D82A}">
-                    <a16:rowId xmlns:a16="http://schemas.microsoft.com/office/drawing/2014/main" val="1379173578"/>
+                    <a16:rowId xmlns:a16="http://schemas.microsoft.com/office/drawing/2014/main" xmlns:p="http://schemas.openxmlformats.org/presentationml/2006/main" xmlns:r="http://schemas.openxmlformats.org/officeDocument/2006/relationships" xmlns:a="http://schemas.openxmlformats.org/drawingml/2006/main" xmlns="" val="1379173578"/>
                   </a:ext>
                 </a:extLst>
               </a:tr>
@@ -5835,7 +5907,7 @@
                 </a:tc>
                 <a:extLst>
                   <a:ext uri="{0D108BD9-81ED-4DB2-BD59-A6C34878D82A}">
-                    <a16:rowId xmlns:a16="http://schemas.microsoft.com/office/drawing/2014/main" val="1105685042"/>
+                    <a16:rowId xmlns:a16="http://schemas.microsoft.com/office/drawing/2014/main" xmlns:p="http://schemas.openxmlformats.org/presentationml/2006/main" xmlns:r="http://schemas.openxmlformats.org/officeDocument/2006/relationships" xmlns:a="http://schemas.openxmlformats.org/drawingml/2006/main" xmlns="" val="1105685042"/>
                   </a:ext>
                 </a:extLst>
               </a:tr>
@@ -5848,7 +5920,7 @@
           <p:cNvPr id="23" name="Rectangle: Rounded Corners 22">
             <a:extLst>
               <a:ext uri="{FF2B5EF4-FFF2-40B4-BE49-F238E27FC236}">
-                <a16:creationId xmlns:a16="http://schemas.microsoft.com/office/drawing/2014/main" id="{B0AE32AE-D63F-495E-A3F4-6AD1FD020463}"/>
+                <a16:creationId xmlns:a16="http://schemas.microsoft.com/office/drawing/2014/main" xmlns:p="http://schemas.openxmlformats.org/presentationml/2006/main" xmlns:r="http://schemas.openxmlformats.org/officeDocument/2006/relationships" xmlns:a="http://schemas.openxmlformats.org/drawingml/2006/main" xmlns="" id="{B0AE32AE-D63F-495E-A3F4-6AD1FD020463}"/>
               </a:ext>
             </a:extLst>
           </p:cNvPr>
@@ -5912,7 +5984,7 @@
           <p:cNvPr id="24" name="Rectangle: Rounded Corners 23">
             <a:extLst>
               <a:ext uri="{FF2B5EF4-FFF2-40B4-BE49-F238E27FC236}">
-                <a16:creationId xmlns:a16="http://schemas.microsoft.com/office/drawing/2014/main" id="{049082BB-75AA-4F86-B766-3E5D9712C1DC}"/>
+                <a16:creationId xmlns:a16="http://schemas.microsoft.com/office/drawing/2014/main" xmlns:p="http://schemas.openxmlformats.org/presentationml/2006/main" xmlns:r="http://schemas.openxmlformats.org/officeDocument/2006/relationships" xmlns:a="http://schemas.openxmlformats.org/drawingml/2006/main" xmlns="" id="{049082BB-75AA-4F86-B766-3E5D9712C1DC}"/>
               </a:ext>
             </a:extLst>
           </p:cNvPr>
@@ -5962,7 +6034,7 @@
           <p:cNvPr id="25" name="Rectangle 24">
             <a:extLst>
               <a:ext uri="{FF2B5EF4-FFF2-40B4-BE49-F238E27FC236}">
-                <a16:creationId xmlns:a16="http://schemas.microsoft.com/office/drawing/2014/main" id="{EC2E5340-4FE0-473C-89C7-7319B6B286C6}"/>
+                <a16:creationId xmlns:a16="http://schemas.microsoft.com/office/drawing/2014/main" xmlns:p="http://schemas.openxmlformats.org/presentationml/2006/main" xmlns:r="http://schemas.openxmlformats.org/officeDocument/2006/relationships" xmlns:a="http://schemas.openxmlformats.org/drawingml/2006/main" xmlns="" id="{EC2E5340-4FE0-473C-89C7-7319B6B286C6}"/>
               </a:ext>
             </a:extLst>
           </p:cNvPr>
@@ -6014,7 +6086,7 @@
     </p:spTree>
     <p:extLst>
       <p:ext uri="{BB962C8B-B14F-4D97-AF65-F5344CB8AC3E}">
-        <p14:creationId xmlns:p14="http://schemas.microsoft.com/office/powerpoint/2010/main" val="1663461927"/>
+        <p14:creationId xmlns:p14="http://schemas.microsoft.com/office/powerpoint/2010/main" xmlns:p="http://schemas.openxmlformats.org/presentationml/2006/main" xmlns:r="http://schemas.openxmlformats.org/officeDocument/2006/relationships" xmlns:a="http://schemas.openxmlformats.org/drawingml/2006/main" xmlns="" val="1663461927"/>
       </p:ext>
     </p:extLst>
   </p:cSld>
@@ -6067,7 +6139,7 @@
     </a:clrScheme>
     <a:fontScheme name="Office Theme">
       <a:majorFont>
-        <a:latin typeface="Calibri Light" panose="020F0302020204030204"/>
+        <a:latin typeface="Calibri Light"/>
         <a:ea typeface=""/>
         <a:cs typeface=""/>
         <a:font script="Jpan" typeface="ＭＳ Ｐゴシック"/>
@@ -6102,7 +6174,7 @@
         <a:font script="Geor" typeface="Sylfaen"/>
       </a:majorFont>
       <a:minorFont>
-        <a:latin typeface="Calibri" panose="020F0502020204030204"/>
+        <a:latin typeface="Calibri"/>
         <a:ea typeface=""/>
         <a:cs typeface=""/>
         <a:font script="Jpan" typeface="ＭＳ Ｐゴシック"/>
@@ -6279,7 +6351,7 @@
   <a:extraClrSchemeLst/>
   <a:extLst>
     <a:ext uri="{05A4C25C-085E-4340-85A3-A5531E510DB2}">
-      <thm15:themeFamily xmlns:thm15="http://schemas.microsoft.com/office/thememl/2012/main" name="Office Theme" id="{62F939B6-93AF-4DB8-9C6B-D6C7DFDC589F}" vid="{4A3C46E8-61CC-4603-A589-7422A47A8E4A}"/>
+      <thm15:themeFamily xmlns:thm15="http://schemas.microsoft.com/office/thememl/2012/main" xmlns:a="http://schemas.openxmlformats.org/drawingml/2006/main" xmlns="" name="Office Theme" id="{62F939B6-93AF-4DB8-9C6B-D6C7DFDC589F}" vid="{4A3C46E8-61CC-4603-A589-7422A47A8E4A}"/>
     </a:ext>
   </a:extLst>
 </a:theme>
@@ -6328,7 +6400,7 @@
     </a:clrScheme>
     <a:fontScheme name="Office">
       <a:majorFont>
-        <a:latin typeface="Calibri Light" panose="020F0302020204030204"/>
+        <a:latin typeface="Calibri Light"/>
         <a:ea typeface=""/>
         <a:cs typeface=""/>
         <a:font script="Jpan" typeface="游ゴシック Light"/>
@@ -6380,7 +6452,7 @@
         <a:font script="Tfng" typeface="Ebrima"/>
       </a:majorFont>
       <a:minorFont>
-        <a:latin typeface="Calibri" panose="020F0502020204030204"/>
+        <a:latin typeface="Calibri"/>
         <a:ea typeface=""/>
         <a:cs typeface=""/>
         <a:font script="Jpan" typeface="游ゴシック"/>
@@ -6574,7 +6646,7 @@
   <a:extraClrSchemeLst/>
   <a:extLst>
     <a:ext uri="{05A4C25C-085E-4340-85A3-A5531E510DB2}">
-      <thm15:themeFamily xmlns:thm15="http://schemas.microsoft.com/office/thememl/2012/main" name="Office Theme" id="{62F939B6-93AF-4DB8-9C6B-D6C7DFDC589F}" vid="{4A3C46E8-61CC-4603-A589-7422A47A8E4A}"/>
+      <thm15:themeFamily xmlns:thm15="http://schemas.microsoft.com/office/thememl/2012/main" xmlns:a="http://schemas.openxmlformats.org/drawingml/2006/main" xmlns="" name="Office Theme" id="{62F939B6-93AF-4DB8-9C6B-D6C7DFDC589F}" vid="{4A3C46E8-61CC-4603-A589-7422A47A8E4A}"/>
     </a:ext>
   </a:extLst>
 </a:theme>

</xml_diff>